<commit_message>
Added checkboxes and ternary operator
</commit_message>
<xml_diff>
--- a/febmay2019/week4-jq/week4notes.pptx
+++ b/febmay2019/week4-jq/week4notes.pptx
@@ -13,6 +13,8 @@
     <p:sldId id="261" r:id="rId7"/>
     <p:sldId id="262" r:id="rId8"/>
     <p:sldId id="263" r:id="rId9"/>
+    <p:sldId id="265" r:id="rId10"/>
+    <p:sldId id="264" r:id="rId11"/>
   </p:sldIdLst>
   <p:sldSz cx="9144000" cy="6858000" type="screen4x3"/>
   <p:notesSz cx="6858000" cy="9144000"/>
@@ -3161,6 +3163,296 @@
     <p:extLst>
       <p:ext uri="{BB962C8B-B14F-4D97-AF65-F5344CB8AC3E}">
         <p14:creationId xmlns:p14="http://schemas.microsoft.com/office/powerpoint/2010/main" val="359847048"/>
+      </p:ext>
+    </p:extLst>
+  </p:cSld>
+  <p:clrMapOvr>
+    <a:masterClrMapping/>
+  </p:clrMapOvr>
+</p:sld>
+</file>
+
+<file path=ppt/slides/slide10.xml><?xml version="1.0" encoding="utf-8"?>
+<p:sld xmlns:a="http://schemas.openxmlformats.org/drawingml/2006/main" xmlns:r="http://schemas.openxmlformats.org/officeDocument/2006/relationships" xmlns:p="http://schemas.openxmlformats.org/presentationml/2006/main">
+  <p:cSld>
+    <p:spTree>
+      <p:nvGrpSpPr>
+        <p:cNvPr id="1" name=""/>
+        <p:cNvGrpSpPr/>
+        <p:nvPr/>
+      </p:nvGrpSpPr>
+      <p:grpSpPr>
+        <a:xfrm>
+          <a:off x="0" y="0"/>
+          <a:ext cx="0" cy="0"/>
+          <a:chOff x="0" y="0"/>
+          <a:chExt cx="0" cy="0"/>
+        </a:xfrm>
+      </p:grpSpPr>
+      <p:pic>
+        <p:nvPicPr>
+          <p:cNvPr id="1026" name="Picture 2"/>
+          <p:cNvPicPr>
+            <a:picLocks noChangeAspect="1" noChangeArrowheads="1"/>
+          </p:cNvPicPr>
+          <p:nvPr/>
+        </p:nvPicPr>
+        <p:blipFill>
+          <a:blip r:embed="rId2">
+            <a:extLst>
+              <a:ext uri="{28A0092B-C50C-407E-A947-70E740481C1C}">
+                <a14:useLocalDpi xmlns:a14="http://schemas.microsoft.com/office/drawing/2010/main" val="0"/>
+              </a:ext>
+            </a:extLst>
+          </a:blip>
+          <a:srcRect/>
+          <a:stretch>
+            <a:fillRect/>
+          </a:stretch>
+        </p:blipFill>
+        <p:spPr bwMode="auto">
+          <a:xfrm>
+            <a:off x="251520" y="404664"/>
+            <a:ext cx="3600450" cy="2733675"/>
+          </a:xfrm>
+          <a:prstGeom prst="rect">
+            <a:avLst/>
+          </a:prstGeom>
+          <a:noFill/>
+          <a:ln>
+            <a:noFill/>
+          </a:ln>
+          <a:extLst>
+            <a:ext uri="{909E8E84-426E-40DD-AFC4-6F175D3DCCD1}">
+              <a14:hiddenFill xmlns:a14="http://schemas.microsoft.com/office/drawing/2010/main">
+                <a:solidFill>
+                  <a:schemeClr val="accent1"/>
+                </a:solidFill>
+              </a14:hiddenFill>
+            </a:ext>
+            <a:ext uri="{91240B29-F687-4F45-9708-019B960494DF}">
+              <a14:hiddenLine xmlns:a14="http://schemas.microsoft.com/office/drawing/2010/main" w="9525">
+                <a:solidFill>
+                  <a:schemeClr val="tx1"/>
+                </a:solidFill>
+                <a:miter lim="800000"/>
+                <a:headEnd/>
+                <a:tailEnd/>
+              </a14:hiddenLine>
+            </a:ext>
+          </a:extLst>
+        </p:spPr>
+      </p:pic>
+      <p:pic>
+        <p:nvPicPr>
+          <p:cNvPr id="1027" name="Picture 3"/>
+          <p:cNvPicPr>
+            <a:picLocks noChangeAspect="1" noChangeArrowheads="1"/>
+          </p:cNvPicPr>
+          <p:nvPr/>
+        </p:nvPicPr>
+        <p:blipFill>
+          <a:blip r:embed="rId3">
+            <a:extLst>
+              <a:ext uri="{28A0092B-C50C-407E-A947-70E740481C1C}">
+                <a14:useLocalDpi xmlns:a14="http://schemas.microsoft.com/office/drawing/2010/main" val="0"/>
+              </a:ext>
+            </a:extLst>
+          </a:blip>
+          <a:srcRect/>
+          <a:stretch>
+            <a:fillRect/>
+          </a:stretch>
+        </p:blipFill>
+        <p:spPr bwMode="auto">
+          <a:xfrm>
+            <a:off x="2555776" y="548680"/>
+            <a:ext cx="6440191" cy="1222821"/>
+          </a:xfrm>
+          <a:prstGeom prst="rect">
+            <a:avLst/>
+          </a:prstGeom>
+          <a:noFill/>
+          <a:ln>
+            <a:noFill/>
+          </a:ln>
+          <a:extLst>
+            <a:ext uri="{909E8E84-426E-40DD-AFC4-6F175D3DCCD1}">
+              <a14:hiddenFill xmlns:a14="http://schemas.microsoft.com/office/drawing/2010/main">
+                <a:solidFill>
+                  <a:schemeClr val="accent1"/>
+                </a:solidFill>
+              </a14:hiddenFill>
+            </a:ext>
+            <a:ext uri="{91240B29-F687-4F45-9708-019B960494DF}">
+              <a14:hiddenLine xmlns:a14="http://schemas.microsoft.com/office/drawing/2010/main" w="9525">
+                <a:solidFill>
+                  <a:schemeClr val="tx1"/>
+                </a:solidFill>
+                <a:miter lim="800000"/>
+                <a:headEnd/>
+                <a:tailEnd/>
+              </a14:hiddenLine>
+            </a:ext>
+          </a:extLst>
+        </p:spPr>
+      </p:pic>
+      <p:sp>
+        <p:nvSpPr>
+          <p:cNvPr id="2" name="TextBox 1"/>
+          <p:cNvSpPr txBox="1"/>
+          <p:nvPr/>
+        </p:nvSpPr>
+        <p:spPr>
+          <a:xfrm>
+            <a:off x="718936" y="2998549"/>
+            <a:ext cx="7525471" cy="646331"/>
+          </a:xfrm>
+          <a:prstGeom prst="rect">
+            <a:avLst/>
+          </a:prstGeom>
+          <a:noFill/>
+        </p:spPr>
+        <p:txBody>
+          <a:bodyPr wrap="square" rtlCol="0">
+            <a:spAutoFit/>
+          </a:bodyPr>
+          <a:lstStyle/>
+          <a:p>
+            <a:r>
+              <a:rPr lang="en-US" dirty="0" smtClean="0"/>
+              <a:t>How would you deal with the fact there is another list on the page that you don’t want styled?</a:t>
+            </a:r>
+            <a:endParaRPr lang="en-IE" dirty="0"/>
+          </a:p>
+        </p:txBody>
+      </p:sp>
+      <p:sp>
+        <p:nvSpPr>
+          <p:cNvPr id="3" name="TextBox 2"/>
+          <p:cNvSpPr txBox="1"/>
+          <p:nvPr/>
+        </p:nvSpPr>
+        <p:spPr>
+          <a:xfrm>
+            <a:off x="4481671" y="1944705"/>
+            <a:ext cx="2664296" cy="369332"/>
+          </a:xfrm>
+          <a:prstGeom prst="rect">
+            <a:avLst/>
+          </a:prstGeom>
+          <a:noFill/>
+        </p:spPr>
+        <p:txBody>
+          <a:bodyPr wrap="square" rtlCol="0">
+            <a:spAutoFit/>
+          </a:bodyPr>
+          <a:lstStyle/>
+          <a:p>
+            <a:r>
+              <a:rPr lang="en-US" dirty="0" smtClean="0"/>
+              <a:t>Called at end of render</a:t>
+            </a:r>
+            <a:endParaRPr lang="en-IE" dirty="0"/>
+          </a:p>
+        </p:txBody>
+      </p:sp>
+      <p:sp>
+        <p:nvSpPr>
+          <p:cNvPr id="6" name="TextBox 5"/>
+          <p:cNvSpPr txBox="1"/>
+          <p:nvPr/>
+        </p:nvSpPr>
+        <p:spPr>
+          <a:xfrm>
+            <a:off x="763413" y="4119463"/>
+            <a:ext cx="7525471" cy="923330"/>
+          </a:xfrm>
+          <a:prstGeom prst="rect">
+            <a:avLst/>
+          </a:prstGeom>
+          <a:noFill/>
+        </p:spPr>
+        <p:txBody>
+          <a:bodyPr wrap="square" rtlCol="0">
+            <a:spAutoFit/>
+          </a:bodyPr>
+          <a:lstStyle/>
+          <a:p>
+            <a:r>
+              <a:rPr lang="en-US" dirty="0" smtClean="0"/>
+              <a:t>How would you </a:t>
+            </a:r>
+            <a:r>
+              <a:rPr lang="en-US" dirty="0" smtClean="0"/>
+              <a:t>go about marking and tracking which items you have completed? </a:t>
+            </a:r>
+          </a:p>
+          <a:p>
+            <a:r>
+              <a:rPr lang="en-US" dirty="0" smtClean="0"/>
+              <a:t>Hint: </a:t>
+            </a:r>
+            <a:r>
+              <a:rPr lang="en-US" dirty="0" err="1" smtClean="0"/>
+              <a:t>json</a:t>
+            </a:r>
+            <a:r>
+              <a:rPr lang="en-US" dirty="0" smtClean="0"/>
+              <a:t> object</a:t>
+            </a:r>
+            <a:endParaRPr lang="en-IE" dirty="0"/>
+          </a:p>
+        </p:txBody>
+      </p:sp>
+      <p:sp>
+        <p:nvSpPr>
+          <p:cNvPr id="7" name="TextBox 6"/>
+          <p:cNvSpPr txBox="1"/>
+          <p:nvPr/>
+        </p:nvSpPr>
+        <p:spPr>
+          <a:xfrm>
+            <a:off x="763413" y="5373216"/>
+            <a:ext cx="7525471" cy="646331"/>
+          </a:xfrm>
+          <a:prstGeom prst="rect">
+            <a:avLst/>
+          </a:prstGeom>
+          <a:noFill/>
+        </p:spPr>
+        <p:txBody>
+          <a:bodyPr wrap="square" rtlCol="0">
+            <a:spAutoFit/>
+          </a:bodyPr>
+          <a:lstStyle/>
+          <a:p>
+            <a:r>
+              <a:rPr lang="en-US" dirty="0" smtClean="0"/>
+              <a:t>How to filter to show only completed / to be completed items</a:t>
+            </a:r>
+          </a:p>
+          <a:p>
+            <a:r>
+              <a:rPr lang="en-US" dirty="0" smtClean="0"/>
+              <a:t>Hint: </a:t>
+            </a:r>
+            <a:r>
+              <a:rPr lang="en-US" dirty="0" err="1" smtClean="0"/>
+              <a:t>array.filter</a:t>
+            </a:r>
+            <a:r>
+              <a:rPr lang="en-US" dirty="0" smtClean="0"/>
+              <a:t> </a:t>
+            </a:r>
+            <a:endParaRPr lang="en-IE" dirty="0"/>
+          </a:p>
+        </p:txBody>
+      </p:sp>
+    </p:spTree>
+    <p:extLst>
+      <p:ext uri="{BB962C8B-B14F-4D97-AF65-F5344CB8AC3E}">
+        <p14:creationId xmlns:p14="http://schemas.microsoft.com/office/powerpoint/2010/main" val="4192718723"/>
       </p:ext>
     </p:extLst>
   </p:cSld>
@@ -4030,6 +4322,90 @@
 </p:sld>
 </file>
 
+<file path=ppt/slides/slide9.xml><?xml version="1.0" encoding="utf-8"?>
+<p:sld xmlns:a="http://schemas.openxmlformats.org/drawingml/2006/main" xmlns:r="http://schemas.openxmlformats.org/officeDocument/2006/relationships" xmlns:p="http://schemas.openxmlformats.org/presentationml/2006/main">
+  <p:cSld>
+    <p:spTree>
+      <p:nvGrpSpPr>
+        <p:cNvPr id="1" name=""/>
+        <p:cNvGrpSpPr/>
+        <p:nvPr/>
+      </p:nvGrpSpPr>
+      <p:grpSpPr>
+        <a:xfrm>
+          <a:off x="0" y="0"/>
+          <a:ext cx="0" cy="0"/>
+          <a:chOff x="0" y="0"/>
+          <a:chExt cx="0" cy="0"/>
+        </a:xfrm>
+      </p:grpSpPr>
+      <p:pic>
+        <p:nvPicPr>
+          <p:cNvPr id="2" name="Picture 3"/>
+          <p:cNvPicPr>
+            <a:picLocks noChangeAspect="1" noChangeArrowheads="1"/>
+          </p:cNvPicPr>
+          <p:nvPr/>
+        </p:nvPicPr>
+        <p:blipFill>
+          <a:blip r:embed="rId2">
+            <a:extLst>
+              <a:ext uri="{28A0092B-C50C-407E-A947-70E740481C1C}">
+                <a14:useLocalDpi xmlns:a14="http://schemas.microsoft.com/office/drawing/2010/main" val="0"/>
+              </a:ext>
+            </a:extLst>
+          </a:blip>
+          <a:srcRect/>
+          <a:stretch>
+            <a:fillRect/>
+          </a:stretch>
+        </p:blipFill>
+        <p:spPr bwMode="auto">
+          <a:xfrm>
+            <a:off x="323528" y="2060848"/>
+            <a:ext cx="8343327" cy="1584176"/>
+          </a:xfrm>
+          <a:prstGeom prst="rect">
+            <a:avLst/>
+          </a:prstGeom>
+          <a:noFill/>
+          <a:ln>
+            <a:noFill/>
+          </a:ln>
+          <a:extLst>
+            <a:ext uri="{909E8E84-426E-40DD-AFC4-6F175D3DCCD1}">
+              <a14:hiddenFill xmlns:a14="http://schemas.microsoft.com/office/drawing/2010/main">
+                <a:solidFill>
+                  <a:schemeClr val="accent1"/>
+                </a:solidFill>
+              </a14:hiddenFill>
+            </a:ext>
+            <a:ext uri="{91240B29-F687-4F45-9708-019B960494DF}">
+              <a14:hiddenLine xmlns:a14="http://schemas.microsoft.com/office/drawing/2010/main" w="9525">
+                <a:solidFill>
+                  <a:schemeClr val="tx1"/>
+                </a:solidFill>
+                <a:miter lim="800000"/>
+                <a:headEnd/>
+                <a:tailEnd/>
+              </a14:hiddenLine>
+            </a:ext>
+          </a:extLst>
+        </p:spPr>
+      </p:pic>
+    </p:spTree>
+    <p:extLst>
+      <p:ext uri="{BB962C8B-B14F-4D97-AF65-F5344CB8AC3E}">
+        <p14:creationId xmlns:p14="http://schemas.microsoft.com/office/powerpoint/2010/main" val="340730699"/>
+      </p:ext>
+    </p:extLst>
+  </p:cSld>
+  <p:clrMapOvr>
+    <a:masterClrMapping/>
+  </p:clrMapOvr>
+</p:sld>
+</file>
+
 <file path=ppt/theme/theme1.xml><?xml version="1.0" encoding="utf-8"?>
 <a:theme xmlns:a="http://schemas.openxmlformats.org/drawingml/2006/main" name="Office Theme">
   <a:themeElements>

</xml_diff>